<commit_message>
Update Practica 1 y 2 - Lucas
</commit_message>
<xml_diff>
--- a/Team Miss Marple.pptx
+++ b/Team Miss Marple.pptx
@@ -4023,8 +4023,8 @@
         </p:nvSpPr>
         <p:spPr>
           <a:xfrm rot="0">
-            <a:off x="5015377" y="771525"/>
-            <a:ext cx="9263777" cy="771525"/>
+            <a:off x="4521685" y="771525"/>
+            <a:ext cx="10251163" cy="771525"/>
           </a:xfrm>
           <a:prstGeom prst="rect">
             <a:avLst/>
@@ -4054,7 +4054,19 @@
                 <a:cs typeface="Nunito Bold"/>
                 <a:sym typeface="Nunito Bold"/>
               </a:rPr>
-              <a:t>Tabla</a:t>
+              <a:t>Tablas: ‘</a:t>
+            </a:r>
+            <a:r>
+              <a:rPr lang="en-US" b="true" sz="4500" u="sng">
+                <a:solidFill>
+                  <a:srgbClr val="000000"/>
+                </a:solidFill>
+                <a:latin typeface="Nunito Bold"/>
+                <a:ea typeface="Nunito Bold"/>
+                <a:cs typeface="Nunito Bold"/>
+                <a:sym typeface="Nunito Bold"/>
+              </a:rPr>
+              <a:t>crime_scene_report’</a:t>
             </a:r>
             <a:r>
               <a:rPr lang="en-US" b="true" sz="4500">
@@ -4066,7 +4078,7 @@
                 <a:cs typeface="Nunito Bold"/>
                 <a:sym typeface="Nunito Bold"/>
               </a:rPr>
-              <a:t> </a:t>
+              <a:t> y ‘</a:t>
             </a:r>
             <a:r>
               <a:rPr lang="en-US" b="true" sz="4500" u="sng">
@@ -4078,31 +4090,7 @@
                 <a:cs typeface="Nunito Bold"/>
                 <a:sym typeface="Nunito Bold"/>
               </a:rPr>
-              <a:t>crime_scene_report </a:t>
-            </a:r>
-            <a:r>
-              <a:rPr lang="en-US" b="true" sz="4500">
-                <a:solidFill>
-                  <a:srgbClr val="000000"/>
-                </a:solidFill>
-                <a:latin typeface="Nunito Bold"/>
-                <a:ea typeface="Nunito Bold"/>
-                <a:cs typeface="Nunito Bold"/>
-                <a:sym typeface="Nunito Bold"/>
-              </a:rPr>
-              <a:t>y </a:t>
-            </a:r>
-            <a:r>
-              <a:rPr lang="en-US" b="true" sz="4500" u="sng">
-                <a:solidFill>
-                  <a:srgbClr val="000000"/>
-                </a:solidFill>
-                <a:latin typeface="Nunito Bold"/>
-                <a:ea typeface="Nunito Bold"/>
-                <a:cs typeface="Nunito Bold"/>
-                <a:sym typeface="Nunito Bold"/>
-              </a:rPr>
-              <a:t>person</a:t>
+              <a:t>person’</a:t>
             </a:r>
           </a:p>
         </p:txBody>
@@ -4479,8 +4467,8 @@
         </p:nvSpPr>
         <p:spPr>
           <a:xfrm rot="0">
-            <a:off x="519834" y="8331200"/>
-            <a:ext cx="13122473" cy="927100"/>
+            <a:off x="560524" y="8237866"/>
+            <a:ext cx="13295709" cy="927100"/>
           </a:xfrm>
           <a:prstGeom prst="rect">
             <a:avLst/>
@@ -4510,7 +4498,7 @@
                 <a:cs typeface="Nunito Bold"/>
                 <a:sym typeface="Nunito Bold"/>
               </a:rPr>
-              <a:t>Testigos Annabel Miller y Morty Shapiro</a:t>
+              <a:t>Testigos: Annabel Miller y Morty Shapiro</a:t>
             </a:r>
           </a:p>
         </p:txBody>
@@ -4728,8 +4716,8 @@
         </p:nvSpPr>
         <p:spPr>
           <a:xfrm rot="0">
-            <a:off x="7270428" y="771525"/>
-            <a:ext cx="4292680" cy="2371725"/>
+            <a:off x="7057783" y="771525"/>
+            <a:ext cx="4717971" cy="2371725"/>
           </a:xfrm>
           <a:prstGeom prst="rect">
             <a:avLst/>
@@ -4756,7 +4744,7 @@
                 <a:cs typeface="Nunito Bold"/>
                 <a:sym typeface="Nunito Bold"/>
               </a:rPr>
-              <a:t>Tabla  </a:t>
+              <a:t>Tabla:  ‘</a:t>
             </a:r>
             <a:r>
               <a:rPr lang="en-US" b="true" sz="4500" u="sng">
@@ -4768,7 +4756,7 @@
                 <a:cs typeface="Nunito Bold"/>
                 <a:sym typeface="Nunito Bold"/>
               </a:rPr>
-              <a:t>interview</a:t>
+              <a:t>interview’</a:t>
             </a:r>
           </a:p>
           <a:p>
@@ -5344,7 +5332,19 @@
                 <a:cs typeface="Nunito Bold"/>
                 <a:sym typeface="Nunito Bold"/>
               </a:rPr>
-              <a:t>Tabla</a:t>
+              <a:t>Tablas: ‘</a:t>
+            </a:r>
+            <a:r>
+              <a:rPr lang="en-US" b="true" sz="4500" u="sng">
+                <a:solidFill>
+                  <a:srgbClr val="000000"/>
+                </a:solidFill>
+                <a:latin typeface="Nunito Bold"/>
+                <a:ea typeface="Nunito Bold"/>
+                <a:cs typeface="Nunito Bold"/>
+                <a:sym typeface="Nunito Bold"/>
+              </a:rPr>
+              <a:t>get_fit_now_check_in’</a:t>
             </a:r>
             <a:r>
               <a:rPr lang="en-US" b="true" sz="4500">
@@ -5356,7 +5356,7 @@
                 <a:cs typeface="Nunito Bold"/>
                 <a:sym typeface="Nunito Bold"/>
               </a:rPr>
-              <a:t> </a:t>
+              <a:t> y ‘</a:t>
             </a:r>
             <a:r>
               <a:rPr lang="en-US" b="true" sz="4500" u="sng">
@@ -5368,55 +5368,7 @@
                 <a:cs typeface="Nunito Bold"/>
                 <a:sym typeface="Nunito Bold"/>
               </a:rPr>
-              <a:t>get_fit_now_check</a:t>
-            </a:r>
-            <a:r>
-              <a:rPr lang="en-US" b="true" sz="4500">
-                <a:solidFill>
-                  <a:srgbClr val="000000"/>
-                </a:solidFill>
-                <a:latin typeface="Nunito Bold"/>
-                <a:ea typeface="Nunito Bold"/>
-                <a:cs typeface="Nunito Bold"/>
-                <a:sym typeface="Nunito Bold"/>
-              </a:rPr>
-              <a:t>_</a:t>
-            </a:r>
-            <a:r>
-              <a:rPr lang="en-US" b="true" sz="4500" u="sng">
-                <a:solidFill>
-                  <a:srgbClr val="000000"/>
-                </a:solidFill>
-                <a:latin typeface="Nunito Bold"/>
-                <a:ea typeface="Nunito Bold"/>
-                <a:cs typeface="Nunito Bold"/>
-                <a:sym typeface="Nunito Bold"/>
-              </a:rPr>
-              <a:t>in</a:t>
-            </a:r>
-            <a:r>
-              <a:rPr lang="en-US" b="true" sz="4500">
-                <a:solidFill>
-                  <a:srgbClr val="000000"/>
-                </a:solidFill>
-                <a:latin typeface="Nunito Bold"/>
-                <a:ea typeface="Nunito Bold"/>
-                <a:cs typeface="Nunito Bold"/>
-                <a:sym typeface="Nunito Bold"/>
-              </a:rPr>
-              <a:t> y </a:t>
-            </a:r>
-            <a:r>
-              <a:rPr lang="en-US" b="true" sz="4500" u="sng">
-                <a:solidFill>
-                  <a:srgbClr val="000000"/>
-                </a:solidFill>
-                <a:latin typeface="Nunito Bold"/>
-                <a:ea typeface="Nunito Bold"/>
-                <a:cs typeface="Nunito Bold"/>
-                <a:sym typeface="Nunito Bold"/>
-              </a:rPr>
-              <a:t>person</a:t>
+              <a:t>person’</a:t>
             </a:r>
           </a:p>
         </p:txBody>
@@ -5726,8 +5678,8 @@
         </p:nvSpPr>
         <p:spPr>
           <a:xfrm rot="0">
-            <a:off x="5305306" y="8323591"/>
-            <a:ext cx="7677388" cy="927100"/>
+            <a:off x="5218688" y="8323591"/>
+            <a:ext cx="7850624" cy="927100"/>
           </a:xfrm>
           <a:prstGeom prst="rect">
             <a:avLst/>
@@ -5757,7 +5709,7 @@
                 <a:cs typeface="Nunito Bold"/>
                 <a:sym typeface="Nunito Bold"/>
               </a:rPr>
-              <a:t>Asesino Jeremy Bowers</a:t>
+              <a:t>Asesino: Jeremy Bowers</a:t>
             </a:r>
           </a:p>
         </p:txBody>
@@ -6006,7 +5958,19 @@
                 <a:cs typeface="Nunito Bold"/>
                 <a:sym typeface="Nunito Bold"/>
               </a:rPr>
-              <a:t>Tabla</a:t>
+              <a:t>Tablas: ‘</a:t>
+            </a:r>
+            <a:r>
+              <a:rPr lang="en-US" b="true" sz="4500" u="sng">
+                <a:solidFill>
+                  <a:srgbClr val="000000"/>
+                </a:solidFill>
+                <a:latin typeface="Nunito Bold"/>
+                <a:ea typeface="Nunito Bold"/>
+                <a:cs typeface="Nunito Bold"/>
+                <a:sym typeface="Nunito Bold"/>
+              </a:rPr>
+              <a:t>driver_license’</a:t>
             </a:r>
             <a:r>
               <a:rPr lang="en-US" b="true" sz="4500">
@@ -6018,7 +5982,7 @@
                 <a:cs typeface="Nunito Bold"/>
                 <a:sym typeface="Nunito Bold"/>
               </a:rPr>
-              <a:t> </a:t>
+              <a:t> y ‘</a:t>
             </a:r>
             <a:r>
               <a:rPr lang="en-US" b="true" sz="4500" u="sng">
@@ -6030,31 +5994,7 @@
                 <a:cs typeface="Nunito Bold"/>
                 <a:sym typeface="Nunito Bold"/>
               </a:rPr>
-              <a:t>driver_license </a:t>
-            </a:r>
-            <a:r>
-              <a:rPr lang="en-US" b="true" sz="4500">
-                <a:solidFill>
-                  <a:srgbClr val="000000"/>
-                </a:solidFill>
-                <a:latin typeface="Nunito Bold"/>
-                <a:ea typeface="Nunito Bold"/>
-                <a:cs typeface="Nunito Bold"/>
-                <a:sym typeface="Nunito Bold"/>
-              </a:rPr>
-              <a:t>y </a:t>
-            </a:r>
-            <a:r>
-              <a:rPr lang="en-US" b="true" sz="4500" u="sng">
-                <a:solidFill>
-                  <a:srgbClr val="000000"/>
-                </a:solidFill>
-                <a:latin typeface="Nunito Bold"/>
-                <a:ea typeface="Nunito Bold"/>
-                <a:cs typeface="Nunito Bold"/>
-                <a:sym typeface="Nunito Bold"/>
-              </a:rPr>
-              <a:t>person</a:t>
+              <a:t>person’</a:t>
             </a:r>
           </a:p>
         </p:txBody>
@@ -6701,8 +6641,8 @@
         </p:nvSpPr>
         <p:spPr>
           <a:xfrm rot="0">
-            <a:off x="4393005" y="8340101"/>
-            <a:ext cx="8767048" cy="1898650"/>
+            <a:off x="1418700" y="8165147"/>
+            <a:ext cx="12698530" cy="2870200"/>
           </a:xfrm>
           <a:prstGeom prst="rect">
             <a:avLst/>
@@ -6729,7 +6669,7 @@
                 <a:cs typeface="Nunito Bold"/>
                 <a:sym typeface="Nunito Bold"/>
               </a:rPr>
-              <a:t>Mandante Miranda Priestly</a:t>
+              <a:t>Miranda Priestly es la persona quién encargó el crimen</a:t>
             </a:r>
           </a:p>
           <a:p>
@@ -7408,8 +7348,8 @@
         </p:nvSpPr>
         <p:spPr>
           <a:xfrm rot="0">
-            <a:off x="6334265" y="800257"/>
-            <a:ext cx="10737652" cy="2336800"/>
+            <a:off x="5387847" y="952500"/>
+            <a:ext cx="10863619" cy="2336800"/>
           </a:xfrm>
           <a:prstGeom prst="rect">
             <a:avLst/>
@@ -7436,7 +7376,7 @@
                 <a:cs typeface="Nunito Bold"/>
                 <a:sym typeface="Nunito Bold"/>
               </a:rPr>
-              <a:t>(1) Conectamos a una base de datos llamada </a:t>
+              <a:t>(1) Conectamos a una base de datos llamada: </a:t>
             </a:r>
           </a:p>
           <a:p>
@@ -7478,7 +7418,7 @@
         </p:nvSpPr>
         <p:spPr>
           <a:xfrm rot="0">
-            <a:off x="1262756" y="3060857"/>
+            <a:off x="1295535" y="3500463"/>
             <a:ext cx="16471940" cy="669925"/>
           </a:xfrm>
           <a:prstGeom prst="rect">
@@ -7521,7 +7461,7 @@
                 <a:cs typeface="Nunito Bold"/>
                 <a:sym typeface="Nunito Bold"/>
               </a:rPr>
-              <a:t>Creamos 5 tablas con el comando </a:t>
+              <a:t>Creamos 5 tablas con el comando: </a:t>
             </a:r>
             <a:r>
               <a:rPr lang="en-US" b="true" sz="3999">
@@ -7533,7 +7473,7 @@
                 <a:cs typeface="Nunito Bold"/>
                 <a:sym typeface="Nunito Bold"/>
               </a:rPr>
-              <a:t>CREATE TABLE IF NOT EXISTS.</a:t>
+              <a:t>CREATE TABLE IF NOT EXISTS</a:t>
             </a:r>
           </a:p>
         </p:txBody>

</xml_diff>